<commit_message>
updated notebook and pptx
</commit_message>
<xml_diff>
--- a/Swin.pptx
+++ b/Swin.pptx
@@ -17,14 +17,14 @@
     <p:sldId id="264" r:id="rId11"/>
     <p:sldId id="269" r:id="rId12"/>
     <p:sldId id="274" r:id="rId13"/>
-    <p:sldId id="281" r:id="rId14"/>
-    <p:sldId id="282" r:id="rId15"/>
-    <p:sldId id="286" r:id="rId16"/>
-    <p:sldId id="278" r:id="rId17"/>
-    <p:sldId id="283" r:id="rId18"/>
-    <p:sldId id="279" r:id="rId19"/>
-    <p:sldId id="284" r:id="rId20"/>
-    <p:sldId id="285" r:id="rId21"/>
+    <p:sldId id="289" r:id="rId14"/>
+    <p:sldId id="281" r:id="rId15"/>
+    <p:sldId id="282" r:id="rId16"/>
+    <p:sldId id="286" r:id="rId17"/>
+    <p:sldId id="278" r:id="rId18"/>
+    <p:sldId id="283" r:id="rId19"/>
+    <p:sldId id="285" r:id="rId20"/>
+    <p:sldId id="288" r:id="rId21"/>
   </p:sldIdLst>
   <p:sldSz cx="12192000" cy="6858000"/>
   <p:notesSz cx="6858000" cy="9144000"/>
@@ -3549,7 +3549,7 @@
           <a:p>
             <a:r>
               <a:rPr lang="en-GB" sz="2400" dirty="0"/>
-              <a:t>Translation inductivity (invariance) still proves crucial for visual </a:t>
+              <a:t>Translation equivariance still proves crucial for visual </a:t>
             </a:r>
             <a:r>
               <a:rPr lang="en-GB" sz="2400" dirty="0" err="1"/>
@@ -3811,7 +3811,7 @@
           <p:cNvPr id="2" name="Title 1">
             <a:extLst>
               <a:ext uri="{FF2B5EF4-FFF2-40B4-BE49-F238E27FC236}">
-                <a16:creationId xmlns:a16="http://schemas.microsoft.com/office/drawing/2014/main" id="{C9975ADE-F1B5-A4F8-B3CC-B59777BC7CEA}"/>
+                <a16:creationId xmlns:a16="http://schemas.microsoft.com/office/drawing/2014/main" id="{053DE335-619E-7E39-2615-9EA3820A446E}"/>
               </a:ext>
             </a:extLst>
           </p:cNvPr>
@@ -3829,7 +3829,7 @@
           <a:p>
             <a:r>
               <a:rPr lang="en-IT" dirty="0"/>
-              <a:t>Problem</a:t>
+              <a:t>Experiment Design</a:t>
             </a:r>
           </a:p>
         </p:txBody>
@@ -3839,7 +3839,7 @@
           <p:cNvPr id="3" name="Content Placeholder 2">
             <a:extLst>
               <a:ext uri="{FF2B5EF4-FFF2-40B4-BE49-F238E27FC236}">
-                <a16:creationId xmlns:a16="http://schemas.microsoft.com/office/drawing/2014/main" id="{AE073019-5F2F-310C-CFEE-0577D88A3329}"/>
+                <a16:creationId xmlns:a16="http://schemas.microsoft.com/office/drawing/2014/main" id="{7F047F44-C014-EDFA-BE04-B8FC33369000}"/>
               </a:ext>
             </a:extLst>
           </p:cNvPr>
@@ -3859,7 +3859,149 @@
           <a:p>
             <a:r>
               <a:rPr lang="en-IT" sz="2400" dirty="0"/>
-              <a:t>Task: Binary classificatio of chest X-ray images into Normal and Pneumonia classes.</a:t>
+              <a:t>Goal:</a:t>
+            </a:r>
+          </a:p>
+          <a:p>
+            <a:pPr lvl="1"/>
+            <a:r>
+              <a:rPr lang="en-IT" sz="2000" dirty="0"/>
+              <a:t>Show the importance of the shifted-window mechanism in Swin architecture.</a:t>
+            </a:r>
+          </a:p>
+          <a:p>
+            <a:pPr lvl="1"/>
+            <a:r>
+              <a:rPr lang="en-IT" sz="2000" dirty="0"/>
+              <a:t>Prove the attitude of the model to tranfer learning it’s knowledge to a new and totally different domain.</a:t>
+            </a:r>
+          </a:p>
+          <a:p>
+            <a:r>
+              <a:rPr lang="en-IT" sz="2400" dirty="0"/>
+              <a:t>Three fine-tuning on the same pre-trained (ImageNet) model Swin-T (28M parameters) with diffierent window sizes to isolate the window importance:</a:t>
+            </a:r>
+          </a:p>
+          <a:p>
+            <a:pPr lvl="1"/>
+            <a:r>
+              <a:rPr lang="en-IT" sz="2000" dirty="0"/>
+              <a:t>Window size 7.</a:t>
+            </a:r>
+          </a:p>
+          <a:p>
+            <a:pPr lvl="1"/>
+            <a:r>
+              <a:rPr lang="en-IT" sz="2000" dirty="0"/>
+              <a:t>Window size 14.</a:t>
+            </a:r>
+          </a:p>
+          <a:p>
+            <a:pPr lvl="1"/>
+            <a:r>
+              <a:rPr lang="en-IT" sz="2000" dirty="0"/>
+              <a:t>Window size 56 (simulation of global attention.,</a:t>
+            </a:r>
+          </a:p>
+          <a:p>
+            <a:pPr marL="457200" lvl="1" indent="0">
+              <a:buNone/>
+            </a:pPr>
+            <a:endParaRPr lang="en-IT" dirty="0"/>
+          </a:p>
+          <a:p>
+            <a:endParaRPr lang="en-IT" sz="2400" dirty="0"/>
+          </a:p>
+          <a:p>
+            <a:pPr lvl="1"/>
+            <a:endParaRPr lang="en-IT" dirty="0"/>
+          </a:p>
+        </p:txBody>
+      </p:sp>
+    </p:spTree>
+    <p:extLst>
+      <p:ext uri="{BB962C8B-B14F-4D97-AF65-F5344CB8AC3E}">
+        <p14:creationId xmlns:p14="http://schemas.microsoft.com/office/powerpoint/2010/main" val="2841897472"/>
+      </p:ext>
+    </p:extLst>
+  </p:cSld>
+  <p:clrMapOvr>
+    <a:masterClrMapping/>
+  </p:clrMapOvr>
+</p:sld>
+</file>
+
+<file path=ppt/slides/slide14.xml><?xml version="1.0" encoding="utf-8"?>
+<p:sld xmlns:a="http://schemas.openxmlformats.org/drawingml/2006/main" xmlns:r="http://schemas.openxmlformats.org/officeDocument/2006/relationships" xmlns:p="http://schemas.openxmlformats.org/presentationml/2006/main">
+  <p:cSld>
+    <p:spTree>
+      <p:nvGrpSpPr>
+        <p:cNvPr id="1" name=""/>
+        <p:cNvGrpSpPr/>
+        <p:nvPr/>
+      </p:nvGrpSpPr>
+      <p:grpSpPr>
+        <a:xfrm>
+          <a:off x="0" y="0"/>
+          <a:ext cx="0" cy="0"/>
+          <a:chOff x="0" y="0"/>
+          <a:chExt cx="0" cy="0"/>
+        </a:xfrm>
+      </p:grpSpPr>
+      <p:sp>
+        <p:nvSpPr>
+          <p:cNvPr id="2" name="Title 1">
+            <a:extLst>
+              <a:ext uri="{FF2B5EF4-FFF2-40B4-BE49-F238E27FC236}">
+                <a16:creationId xmlns:a16="http://schemas.microsoft.com/office/drawing/2014/main" id="{C9975ADE-F1B5-A4F8-B3CC-B59777BC7CEA}"/>
+              </a:ext>
+            </a:extLst>
+          </p:cNvPr>
+          <p:cNvSpPr>
+            <a:spLocks noGrp="1"/>
+          </p:cNvSpPr>
+          <p:nvPr>
+            <p:ph type="title"/>
+          </p:nvPr>
+        </p:nvSpPr>
+        <p:spPr/>
+        <p:txBody>
+          <a:bodyPr/>
+          <a:lstStyle/>
+          <a:p>
+            <a:r>
+              <a:rPr lang="en-IT" dirty="0"/>
+              <a:t>Task: X-Ray Classification</a:t>
+            </a:r>
+          </a:p>
+        </p:txBody>
+      </p:sp>
+      <p:sp>
+        <p:nvSpPr>
+          <p:cNvPr id="3" name="Content Placeholder 2">
+            <a:extLst>
+              <a:ext uri="{FF2B5EF4-FFF2-40B4-BE49-F238E27FC236}">
+                <a16:creationId xmlns:a16="http://schemas.microsoft.com/office/drawing/2014/main" id="{AE073019-5F2F-310C-CFEE-0577D88A3329}"/>
+              </a:ext>
+            </a:extLst>
+          </p:cNvPr>
+          <p:cNvSpPr>
+            <a:spLocks noGrp="1"/>
+          </p:cNvSpPr>
+          <p:nvPr>
+            <p:ph idx="1"/>
+          </p:nvPr>
+        </p:nvSpPr>
+        <p:spPr/>
+        <p:txBody>
+          <a:bodyPr>
+            <a:normAutofit/>
+          </a:bodyPr>
+          <a:lstStyle/>
+          <a:p>
+            <a:r>
+              <a:rPr lang="en-IT" sz="2400" dirty="0"/>
+              <a:t>Binary classification of chest X-ray images into Normal and Pneumonia classes.</a:t>
             </a:r>
           </a:p>
           <a:p>
@@ -3914,7 +4056,7 @@
 </p:sld>
 </file>
 
-<file path=ppt/slides/slide14.xml><?xml version="1.0" encoding="utf-8"?>
+<file path=ppt/slides/slide15.xml><?xml version="1.0" encoding="utf-8"?>
 <p:sld xmlns:a="http://schemas.openxmlformats.org/drawingml/2006/main" xmlns:r="http://schemas.openxmlformats.org/officeDocument/2006/relationships" xmlns:p="http://schemas.openxmlformats.org/presentationml/2006/main">
   <p:cSld>
     <p:spTree>
@@ -3983,8 +4125,12 @@
           <a:lstStyle/>
           <a:p>
             <a:r>
+              <a:rPr lang="en-GB" sz="2400" dirty="0"/>
+              <a:t>Chest X-Ray dataset (5,865 images)</a:t>
+            </a:r>
+            <a:r>
               <a:rPr lang="en-IT" sz="2400" dirty="0"/>
-              <a:t>Unbalanced Dataset 5865 images Chest X-Ray dataset:</a:t>
+              <a:t>:</a:t>
             </a:r>
           </a:p>
           <a:p>
@@ -4046,7 +4192,7 @@
 </p:sld>
 </file>
 
-<file path=ppt/slides/slide15.xml><?xml version="1.0" encoding="utf-8"?>
+<file path=ppt/slides/slide16.xml><?xml version="1.0" encoding="utf-8"?>
 <p:sld xmlns:a="http://schemas.openxmlformats.org/drawingml/2006/main" xmlns:r="http://schemas.openxmlformats.org/officeDocument/2006/relationships" xmlns:p="http://schemas.openxmlformats.org/presentationml/2006/main">
   <p:cSld>
     <p:spTree>
@@ -4115,18 +4261,14 @@
           <a:lstStyle/>
           <a:p>
             <a:r>
+              <a:rPr lang="en-GB" sz="2400" dirty="0"/>
+              <a:t>Standard (unweighted) Cross-Entropy Loss: despite class imbalance, the model learns a well-balanced decision boundary without explicit weighting.</a:t>
+            </a:r>
+          </a:p>
+          <a:p>
+            <a:r>
               <a:rPr lang="en-IT" sz="2400" dirty="0"/>
-              <a:t>Due to original class imbalance </a:t>
-            </a:r>
-            <a:r>
-              <a:rPr lang="en-GB" sz="2400" dirty="0"/>
-              <a:t>in favor of positive case, it has been used the classic Binary Cross Entropy Loss.</a:t>
-            </a:r>
-          </a:p>
-          <a:p>
-            <a:r>
-              <a:rPr lang="en-IT" sz="2400" dirty="0"/>
-              <a:t>Same backbone (Swin-Tiny, 28M parmeters).</a:t>
+              <a:t>Same backbone (Swin-Tiny, 28M parameters).</a:t>
             </a:r>
           </a:p>
           <a:p>
@@ -4155,7 +4297,7 @@
               <a:t>AdamW</a:t>
             </a:r>
             <a:r>
-              <a:rPr lang="en-US" sz="2400">
+              <a:rPr lang="en-US" sz="2400" dirty="0">
                 <a:latin typeface="Calibri" pitchFamily="34" charset="0"/>
                 <a:ea typeface="Calibri" pitchFamily="34" charset="-122"/>
                 <a:cs typeface="Calibri" pitchFamily="34" charset="-120"/>
@@ -4228,7 +4370,7 @@
 </p:sld>
 </file>
 
-<file path=ppt/slides/slide16.xml><?xml version="1.0" encoding="utf-8"?>
+<file path=ppt/slides/slide17.xml><?xml version="1.0" encoding="utf-8"?>
 <p:sld xmlns:a="http://schemas.openxmlformats.org/drawingml/2006/main" xmlns:r="http://schemas.openxmlformats.org/officeDocument/2006/relationships" xmlns:p="http://schemas.openxmlformats.org/presentationml/2006/main">
   <p:cSld>
     <p:bg>
@@ -5819,96 +5961,6 @@
 </p:sld>
 </file>
 
-<file path=ppt/slides/slide17.xml><?xml version="1.0" encoding="utf-8"?>
-<p:sld xmlns:a="http://schemas.openxmlformats.org/drawingml/2006/main" xmlns:r="http://schemas.openxmlformats.org/officeDocument/2006/relationships" xmlns:p="http://schemas.openxmlformats.org/presentationml/2006/main">
-  <p:cSld>
-    <p:spTree>
-      <p:nvGrpSpPr>
-        <p:cNvPr id="1" name=""/>
-        <p:cNvGrpSpPr/>
-        <p:nvPr/>
-      </p:nvGrpSpPr>
-      <p:grpSpPr>
-        <a:xfrm>
-          <a:off x="0" y="0"/>
-          <a:ext cx="0" cy="0"/>
-          <a:chOff x="0" y="0"/>
-          <a:chExt cx="0" cy="0"/>
-        </a:xfrm>
-      </p:grpSpPr>
-      <p:sp>
-        <p:nvSpPr>
-          <p:cNvPr id="2" name="Title 1">
-            <a:extLst>
-              <a:ext uri="{FF2B5EF4-FFF2-40B4-BE49-F238E27FC236}">
-                <a16:creationId xmlns:a16="http://schemas.microsoft.com/office/drawing/2014/main" id="{6FC9954C-6072-1F24-23E5-3DDF980CF22D}"/>
-              </a:ext>
-            </a:extLst>
-          </p:cNvPr>
-          <p:cNvSpPr>
-            <a:spLocks noGrp="1"/>
-          </p:cNvSpPr>
-          <p:nvPr>
-            <p:ph type="title"/>
-          </p:nvPr>
-        </p:nvSpPr>
-        <p:spPr/>
-        <p:txBody>
-          <a:bodyPr/>
-          <a:lstStyle/>
-          <a:p>
-            <a:r>
-              <a:rPr lang="en-IT" dirty="0"/>
-              <a:t>Memory &amp; Speed</a:t>
-            </a:r>
-          </a:p>
-        </p:txBody>
-      </p:sp>
-      <p:pic>
-        <p:nvPicPr>
-          <p:cNvPr id="5" name="Content Placeholder 4">
-            <a:extLst>
-              <a:ext uri="{FF2B5EF4-FFF2-40B4-BE49-F238E27FC236}">
-                <a16:creationId xmlns:a16="http://schemas.microsoft.com/office/drawing/2014/main" id="{C0A3F9F9-C221-563B-C48D-09D9FB10506D}"/>
-              </a:ext>
-            </a:extLst>
-          </p:cNvPr>
-          <p:cNvPicPr>
-            <a:picLocks noGrp="1" noChangeAspect="1"/>
-          </p:cNvPicPr>
-          <p:nvPr>
-            <p:ph idx="1"/>
-          </p:nvPr>
-        </p:nvPicPr>
-        <p:blipFill>
-          <a:blip r:embed="rId2"/>
-          <a:stretch>
-            <a:fillRect/>
-          </a:stretch>
-        </p:blipFill>
-        <p:spPr>
-          <a:xfrm>
-            <a:off x="2965159" y="1825625"/>
-            <a:ext cx="6261681" cy="4351338"/>
-          </a:xfrm>
-          <a:prstGeom prst="rect">
-            <a:avLst/>
-          </a:prstGeom>
-        </p:spPr>
-      </p:pic>
-    </p:spTree>
-    <p:extLst>
-      <p:ext uri="{BB962C8B-B14F-4D97-AF65-F5344CB8AC3E}">
-        <p14:creationId xmlns:p14="http://schemas.microsoft.com/office/powerpoint/2010/main" val="2969127900"/>
-      </p:ext>
-    </p:extLst>
-  </p:cSld>
-  <p:clrMapOvr>
-    <a:masterClrMapping/>
-  </p:clrMapOvr>
-</p:sld>
-</file>
-
 <file path=ppt/slides/slide18.xml><?xml version="1.0" encoding="utf-8"?>
 <p:sld xmlns:a="http://schemas.openxmlformats.org/drawingml/2006/main" xmlns:r="http://schemas.openxmlformats.org/officeDocument/2006/relationships" xmlns:p="http://schemas.openxmlformats.org/presentationml/2006/main">
   <p:cSld>
@@ -5931,7 +5983,7 @@
           <p:cNvPr id="2" name="Title 1">
             <a:extLst>
               <a:ext uri="{FF2B5EF4-FFF2-40B4-BE49-F238E27FC236}">
-                <a16:creationId xmlns:a16="http://schemas.microsoft.com/office/drawing/2014/main" id="{5A02C203-6346-FF22-01D9-4DFDEB9C885A}"/>
+                <a16:creationId xmlns:a16="http://schemas.microsoft.com/office/drawing/2014/main" id="{6FC9954C-6072-1F24-23E5-3DDF980CF22D}"/>
               </a:ext>
             </a:extLst>
           </p:cNvPr>
@@ -5949,26 +6001,24 @@
           <a:p>
             <a:r>
               <a:rPr lang="en-IT" dirty="0"/>
-              <a:t>ROC Curves and Holistic Comparison</a:t>
+              <a:t>Memory &amp; Speed</a:t>
             </a:r>
           </a:p>
         </p:txBody>
       </p:sp>
       <p:pic>
         <p:nvPicPr>
-          <p:cNvPr id="4" name="Content Placeholder 3">
-            <a:extLst>
-              <a:ext uri="{FF2B5EF4-FFF2-40B4-BE49-F238E27FC236}">
-                <a16:creationId xmlns:a16="http://schemas.microsoft.com/office/drawing/2014/main" id="{20C0C0B2-22C7-C6D4-497E-CA405CF2C770}"/>
+          <p:cNvPr id="8" name="Picture 7">
+            <a:extLst>
+              <a:ext uri="{FF2B5EF4-FFF2-40B4-BE49-F238E27FC236}">
+                <a16:creationId xmlns:a16="http://schemas.microsoft.com/office/drawing/2014/main" id="{93B1F5FD-9B80-CF43-02A0-1D095EB5B36D}"/>
               </a:ext>
             </a:extLst>
           </p:cNvPr>
           <p:cNvPicPr>
-            <a:picLocks noGrp="1" noChangeAspect="1"/>
+            <a:picLocks noChangeAspect="1"/>
           </p:cNvPicPr>
-          <p:nvPr>
-            <p:ph idx="1"/>
-          </p:nvPr>
+          <p:nvPr/>
         </p:nvPicPr>
         <p:blipFill>
           <a:blip r:embed="rId2"/>
@@ -5978,8 +6028,8 @@
         </p:blipFill>
         <p:spPr>
           <a:xfrm>
-            <a:off x="942437" y="1548788"/>
-            <a:ext cx="4915877" cy="5012981"/>
+            <a:off x="704695" y="1483667"/>
+            <a:ext cx="5391305" cy="3746500"/>
           </a:xfrm>
           <a:prstGeom prst="rect">
             <a:avLst/>
@@ -5988,10 +6038,10 @@
       </p:pic>
       <p:pic>
         <p:nvPicPr>
-          <p:cNvPr id="5" name="Picture 4">
-            <a:extLst>
-              <a:ext uri="{FF2B5EF4-FFF2-40B4-BE49-F238E27FC236}">
-                <a16:creationId xmlns:a16="http://schemas.microsoft.com/office/drawing/2014/main" id="{0DD37217-5427-FB01-0EF7-6A5120D5B2D5}"/>
+          <p:cNvPr id="9" name="Picture 8">
+            <a:extLst>
+              <a:ext uri="{FF2B5EF4-FFF2-40B4-BE49-F238E27FC236}">
+                <a16:creationId xmlns:a16="http://schemas.microsoft.com/office/drawing/2014/main" id="{9FCBA313-DAC5-E875-6E83-FA1A8F7DC736}"/>
               </a:ext>
             </a:extLst>
           </p:cNvPr>
@@ -6002,24 +6052,74 @@
         </p:nvPicPr>
         <p:blipFill>
           <a:blip r:embed="rId3"/>
+          <a:srcRect t="7768" r="49608"/>
           <a:stretch>
             <a:fillRect/>
           </a:stretch>
         </p:blipFill>
         <p:spPr>
           <a:xfrm>
-            <a:off x="6333686" y="1789816"/>
-            <a:ext cx="5020114" cy="4717697"/>
+            <a:off x="6096000" y="1276648"/>
+            <a:ext cx="5839867" cy="3953519"/>
           </a:xfrm>
           <a:prstGeom prst="rect">
             <a:avLst/>
           </a:prstGeom>
         </p:spPr>
       </p:pic>
+      <p:sp>
+        <p:nvSpPr>
+          <p:cNvPr id="10" name="TextBox 9">
+            <a:extLst>
+              <a:ext uri="{FF2B5EF4-FFF2-40B4-BE49-F238E27FC236}">
+                <a16:creationId xmlns:a16="http://schemas.microsoft.com/office/drawing/2014/main" id="{09DEF60E-BF37-0BD3-EE68-A310261125B6}"/>
+              </a:ext>
+            </a:extLst>
+          </p:cNvPr>
+          <p:cNvSpPr txBox="1"/>
+          <p:nvPr/>
+        </p:nvSpPr>
+        <p:spPr>
+          <a:xfrm>
+            <a:off x="838200" y="5292546"/>
+            <a:ext cx="10970941" cy="1569660"/>
+          </a:xfrm>
+          <a:prstGeom prst="rect">
+            <a:avLst/>
+          </a:prstGeom>
+          <a:noFill/>
+        </p:spPr>
+        <p:txBody>
+          <a:bodyPr wrap="square" rtlCol="0">
+            <a:spAutoFit/>
+          </a:bodyPr>
+          <a:lstStyle/>
+          <a:p>
+            <a:pPr marL="342900" indent="-342900">
+              <a:buFont typeface="Arial" panose="020B0604020202020204" pitchFamily="34" charset="0"/>
+              <a:buChar char="•"/>
+            </a:pPr>
+            <a:r>
+              <a:rPr lang="en-IT" sz="2400" dirty="0"/>
+              <a:t>VRAM Memory usage results show the increasing trend increasing the window size.</a:t>
+            </a:r>
+          </a:p>
+          <a:p>
+            <a:pPr marL="342900" indent="-342900">
+              <a:buFont typeface="Arial" panose="020B0604020202020204" pitchFamily="34" charset="0"/>
+              <a:buChar char="•"/>
+            </a:pPr>
+            <a:r>
+              <a:rPr lang="en-IT" sz="2400" dirty="0"/>
+              <a:t>Inference shows an unexpected behaviour but confirm the general ecpected trend.</a:t>
+            </a:r>
+          </a:p>
+        </p:txBody>
+      </p:sp>
     </p:spTree>
     <p:extLst>
       <p:ext uri="{BB962C8B-B14F-4D97-AF65-F5344CB8AC3E}">
-        <p14:creationId xmlns:p14="http://schemas.microsoft.com/office/powerpoint/2010/main" val="3678829801"/>
+        <p14:creationId xmlns:p14="http://schemas.microsoft.com/office/powerpoint/2010/main" val="2969127900"/>
       </p:ext>
     </p:extLst>
   </p:cSld>
@@ -6051,7 +6151,7 @@
           <p:cNvPr id="2" name="Title 1">
             <a:extLst>
               <a:ext uri="{FF2B5EF4-FFF2-40B4-BE49-F238E27FC236}">
-                <a16:creationId xmlns:a16="http://schemas.microsoft.com/office/drawing/2014/main" id="{B9C95DA5-1C7B-118F-2562-C48699219138}"/>
+                <a16:creationId xmlns:a16="http://schemas.microsoft.com/office/drawing/2014/main" id="{27B64616-25B2-92F1-A2C7-1EA6440DBD5F}"/>
               </a:ext>
             </a:extLst>
           </p:cNvPr>
@@ -6069,7 +6169,7 @@
           <a:p>
             <a:r>
               <a:rPr lang="en-IT" dirty="0"/>
-              <a:t>Holistic Comparison</a:t>
+              <a:t>Conclusion</a:t>
             </a:r>
           </a:p>
         </p:txBody>
@@ -6079,7 +6179,7 @@
           <p:cNvPr id="3" name="Content Placeholder 2">
             <a:extLst>
               <a:ext uri="{FF2B5EF4-FFF2-40B4-BE49-F238E27FC236}">
-                <a16:creationId xmlns:a16="http://schemas.microsoft.com/office/drawing/2014/main" id="{EB613D0D-2BB6-3276-77C2-24509B03FBED}"/>
+                <a16:creationId xmlns:a16="http://schemas.microsoft.com/office/drawing/2014/main" id="{C257EBBC-51B9-5319-C034-05FFDB2D3E78}"/>
               </a:ext>
             </a:extLst>
           </p:cNvPr>
@@ -6092,19 +6192,70 @@
         </p:nvSpPr>
         <p:spPr/>
         <p:txBody>
-          <a:bodyPr/>
-          <a:lstStyle/>
-          <a:p>
-            <a:endParaRPr lang="en-IT" dirty="0"/>
+          <a:bodyPr>
+            <a:normAutofit/>
+          </a:bodyPr>
+          <a:lstStyle/>
+          <a:p>
+            <a:r>
+              <a:rPr lang="en-IT" sz="2400" dirty="0"/>
+              <a:t>All three models achieve strong performance.</a:t>
+            </a:r>
+          </a:p>
+          <a:p>
+            <a:r>
+              <a:rPr lang="en-IT" sz="2400" dirty="0"/>
+              <a:t>Increasing windows size, doesn’t guarantee extra performance. On the contrary:</a:t>
+            </a:r>
+          </a:p>
+          <a:p>
+            <a:pPr lvl="1"/>
+            <a:r>
+              <a:rPr lang="en-IT" sz="2000" dirty="0"/>
+              <a:t>Win56 is slightly worse than win14 and win7 overall.</a:t>
+            </a:r>
+          </a:p>
+          <a:p>
+            <a:r>
+              <a:rPr lang="en-IT" sz="2400" dirty="0"/>
+              <a:t>Global (ViT simulation) attention is the weakest:</a:t>
+            </a:r>
+          </a:p>
+          <a:p>
+            <a:pPr lvl="1"/>
+            <a:r>
+              <a:rPr lang="en-IT" sz="2000" dirty="0"/>
+              <a:t>Lowest metrics performances overall.</a:t>
+            </a:r>
+          </a:p>
+          <a:p>
+            <a:pPr lvl="1"/>
+            <a:r>
+              <a:rPr lang="en-GB" sz="2000" dirty="0"/>
+              <a:t>higher memory cost</a:t>
+            </a:r>
+          </a:p>
+          <a:p>
+            <a:pPr lvl="1"/>
+            <a:r>
+              <a:rPr lang="en-IT" sz="2000" dirty="0"/>
+              <a:t>Slower Inference.</a:t>
+            </a:r>
+          </a:p>
+          <a:p>
+            <a:r>
+              <a:rPr lang="en-IT" sz="2400" dirty="0"/>
+              <a:t>Locality is a beneficial inductive bias.</a:t>
+            </a:r>
           </a:p>
         </p:txBody>
       </p:sp>
       <p:pic>
         <p:nvPicPr>
-          <p:cNvPr id="4" name="Picture 3">
-            <a:extLst>
-              <a:ext uri="{FF2B5EF4-FFF2-40B4-BE49-F238E27FC236}">
-                <a16:creationId xmlns:a16="http://schemas.microsoft.com/office/drawing/2014/main" id="{8E879DD4-0619-8E69-4CE9-A4EC727F34B0}"/>
+          <p:cNvPr id="6" name="Picture 5">
+            <a:extLst>
+              <a:ext uri="{FF2B5EF4-FFF2-40B4-BE49-F238E27FC236}">
+                <a16:creationId xmlns:a16="http://schemas.microsoft.com/office/drawing/2014/main" id="{D5BF8B62-ABF1-FB96-C713-4CF2F72CB076}"/>
               </a:ext>
             </a:extLst>
           </p:cNvPr>
@@ -6121,8 +6272,8 @@
         </p:blipFill>
         <p:spPr>
           <a:xfrm>
-            <a:off x="4462942" y="1894320"/>
-            <a:ext cx="4268307" cy="4011180"/>
+            <a:off x="7615978" y="2784763"/>
+            <a:ext cx="3737822" cy="3512652"/>
           </a:xfrm>
           <a:prstGeom prst="rect">
             <a:avLst/>
@@ -6132,7 +6283,7 @@
     </p:spTree>
     <p:extLst>
       <p:ext uri="{BB962C8B-B14F-4D97-AF65-F5344CB8AC3E}">
-        <p14:creationId xmlns:p14="http://schemas.microsoft.com/office/powerpoint/2010/main" val="85257651"/>
+        <p14:creationId xmlns:p14="http://schemas.microsoft.com/office/powerpoint/2010/main" val="2870084211"/>
       </p:ext>
     </p:extLst>
   </p:cSld>
@@ -6301,7 +6452,7 @@
           <p:cNvPr id="2" name="Title 1">
             <a:extLst>
               <a:ext uri="{FF2B5EF4-FFF2-40B4-BE49-F238E27FC236}">
-                <a16:creationId xmlns:a16="http://schemas.microsoft.com/office/drawing/2014/main" id="{27B64616-25B2-92F1-A2C7-1EA6440DBD5F}"/>
+                <a16:creationId xmlns:a16="http://schemas.microsoft.com/office/drawing/2014/main" id="{DD31179A-54F1-A984-13C1-9A5B328850BA}"/>
               </a:ext>
             </a:extLst>
           </p:cNvPr>
@@ -6312,90 +6463,32 @@
             <p:ph type="title"/>
           </p:nvPr>
         </p:nvSpPr>
-        <p:spPr/>
-        <p:txBody>
-          <a:bodyPr/>
-          <a:lstStyle/>
-          <a:p>
+        <p:spPr>
+          <a:xfrm>
+            <a:off x="0" y="2825693"/>
+            <a:ext cx="12192000" cy="1325563"/>
+          </a:xfrm>
+        </p:spPr>
+        <p:txBody>
+          <a:bodyPr>
+            <a:normAutofit fontScale="90000"/>
+          </a:bodyPr>
+          <a:lstStyle/>
+          <a:p>
+            <a:pPr algn="ctr"/>
             <a:r>
               <a:rPr lang="en-IT" dirty="0"/>
-              <a:t>Conclusion</a:t>
-            </a:r>
-          </a:p>
-        </p:txBody>
-      </p:sp>
-      <p:sp>
-        <p:nvSpPr>
-          <p:cNvPr id="3" name="Content Placeholder 2">
-            <a:extLst>
-              <a:ext uri="{FF2B5EF4-FFF2-40B4-BE49-F238E27FC236}">
-                <a16:creationId xmlns:a16="http://schemas.microsoft.com/office/drawing/2014/main" id="{C257EBBC-51B9-5319-C034-05FFDB2D3E78}"/>
-              </a:ext>
-            </a:extLst>
-          </p:cNvPr>
-          <p:cNvSpPr>
-            <a:spLocks noGrp="1"/>
-          </p:cNvSpPr>
-          <p:nvPr>
-            <p:ph idx="1"/>
-          </p:nvPr>
-        </p:nvSpPr>
-        <p:spPr/>
-        <p:txBody>
-          <a:bodyPr>
-            <a:normAutofit/>
-          </a:bodyPr>
-          <a:lstStyle/>
-          <a:p>
-            <a:r>
-              <a:rPr lang="en-IT" sz="2400" dirty="0"/>
-              <a:t>Swin-T(Win7) achieves the best accuracy, lowest memory and fast inference.</a:t>
-            </a:r>
-          </a:p>
-          <a:p>
-            <a:r>
-              <a:rPr lang="en-IT" sz="2400" dirty="0"/>
-              <a:t>Increasing windows size degrade performance:</a:t>
-            </a:r>
-          </a:p>
-          <a:p>
-            <a:pPr lvl="1"/>
-            <a:r>
+              <a:t>Thank you for your attention</a:t>
+            </a:r>
+            <a:br>
               <a:rPr lang="en-IT" dirty="0"/>
-              <a:t>Win56 is slighlty worse than win14 and win7.</a:t>
-            </a:r>
-          </a:p>
-          <a:p>
-            <a:r>
-              <a:rPr lang="en-IT" sz="2400" dirty="0"/>
-              <a:t>Global (ViT simulation) attention is the weakes:</a:t>
-            </a:r>
-          </a:p>
-          <a:p>
-            <a:pPr lvl="1"/>
-            <a:r>
+            </a:br>
+            <a:br>
               <a:rPr lang="en-IT" dirty="0"/>
-              <a:t>Lowest metrics performances overall.</a:t>
-            </a:r>
-          </a:p>
-          <a:p>
-            <a:pPr lvl="1"/>
+            </a:br>
             <a:r>
               <a:rPr lang="en-IT" dirty="0"/>
-              <a:t>Quadratic memory use w.r.t image size.</a:t>
-            </a:r>
-          </a:p>
-          <a:p>
-            <a:pPr lvl="1"/>
-            <a:r>
-              <a:rPr lang="en-IT" dirty="0"/>
-              <a:t>Slower Inference.</a:t>
-            </a:r>
-          </a:p>
-          <a:p>
-            <a:r>
-              <a:rPr lang="en-IT" sz="2400" dirty="0"/>
-              <a:t>Localily is a beneficial inductive bias for chest X-ray classificatio at 224x224.</a:t>
+              <a:t>Questions?</a:t>
             </a:r>
           </a:p>
         </p:txBody>
@@ -6403,7 +6496,7 @@
     </p:spTree>
     <p:extLst>
       <p:ext uri="{BB962C8B-B14F-4D97-AF65-F5344CB8AC3E}">
-        <p14:creationId xmlns:p14="http://schemas.microsoft.com/office/powerpoint/2010/main" val="2870084211"/>
+        <p14:creationId xmlns:p14="http://schemas.microsoft.com/office/powerpoint/2010/main" val="2345039916"/>
       </p:ext>
     </p:extLst>
   </p:cSld>
@@ -6516,7 +6609,7 @@
             </a:r>
             <a:r>
               <a:rPr lang="en-GB" sz="2400" dirty="0"/>
-              <a:t>: O(N2), where N is the number of tokens (pixels/patch)</a:t>
+              <a:t>: O(N^2), where N is the number of tokens (patches)</a:t>
             </a:r>
           </a:p>
           <a:p>
@@ -6965,22 +7058,14 @@
             <a:pPr lvl="1"/>
             <a:r>
               <a:rPr lang="en-GB" sz="2000" dirty="0"/>
-              <a:t>Reduce the number of tokens by a factor of 4 (</a:t>
-            </a:r>
-            <a:r>
-              <a:rPr lang="en-GB" sz="2000" dirty="0" err="1"/>
-              <a:t>downsampling</a:t>
-            </a:r>
+              <a:t>Reduce the number of tokens by a factor of 4 (downsampling 2×).</a:t>
+            </a:r>
+          </a:p>
+          <a:p>
+            <a:pPr lvl="1"/>
             <a:r>
               <a:rPr lang="en-GB" sz="2000" dirty="0"/>
-              <a:t> 2×).</a:t>
-            </a:r>
-          </a:p>
-          <a:p>
-            <a:pPr lvl="1"/>
-            <a:r>
-              <a:rPr lang="en-GB" sz="2000" dirty="0"/>
-              <a:t>Increase the Result: Output with decreasing resolutions (H/4,H/8,H/16,H/32), ideal for Feature Pyramid Networks (FPN) or U-Net a feature size (e.g. C to 2C).</a:t>
+              <a:t>Result: output with decreasing resolutions (H/4,H/8,H/16,H/32), ideal for Feature Pyramid Networks (FPN) or U-Net a feature size (e.g. C to 2C).</a:t>
             </a:r>
             <a:endParaRPr lang="en-IT" sz="2000" dirty="0"/>
           </a:p>
@@ -7134,6 +7219,41 @@
           <a:p>
             <a:pPr algn="ctr"/>
             <a:endParaRPr lang="en-IT"/>
+          </a:p>
+        </p:txBody>
+      </p:sp>
+      <p:sp>
+        <p:nvSpPr>
+          <p:cNvPr id="10" name="TextBox 9">
+            <a:extLst>
+              <a:ext uri="{FF2B5EF4-FFF2-40B4-BE49-F238E27FC236}">
+                <a16:creationId xmlns:a16="http://schemas.microsoft.com/office/drawing/2014/main" id="{324C1B85-0574-98B6-EB1E-C63DFF15150E}"/>
+              </a:ext>
+            </a:extLst>
+          </p:cNvPr>
+          <p:cNvSpPr txBox="1"/>
+          <p:nvPr/>
+        </p:nvSpPr>
+        <p:spPr>
+          <a:xfrm>
+            <a:off x="9336046" y="4025590"/>
+            <a:ext cx="2568617" cy="646331"/>
+          </a:xfrm>
+          <a:prstGeom prst="rect">
+            <a:avLst/>
+          </a:prstGeom>
+          <a:noFill/>
+        </p:spPr>
+        <p:txBody>
+          <a:bodyPr wrap="square" rtlCol="0">
+            <a:spAutoFit/>
+          </a:bodyPr>
+          <a:lstStyle/>
+          <a:p>
+            <a:r>
+              <a:rPr lang="en-IT" dirty="0"/>
+              <a:t>Explain better this last point</a:t>
+            </a:r>
           </a:p>
         </p:txBody>
       </p:sp>
@@ -7312,6 +7432,49 @@
           </a:prstGeom>
         </p:spPr>
       </p:pic>
+      <p:sp>
+        <p:nvSpPr>
+          <p:cNvPr id="11" name="TextBox 10">
+            <a:extLst>
+              <a:ext uri="{FF2B5EF4-FFF2-40B4-BE49-F238E27FC236}">
+                <a16:creationId xmlns:a16="http://schemas.microsoft.com/office/drawing/2014/main" id="{7CBB2F69-DD30-E58A-6989-9D4F51B7C81F}"/>
+              </a:ext>
+            </a:extLst>
+          </p:cNvPr>
+          <p:cNvSpPr txBox="1"/>
+          <p:nvPr/>
+        </p:nvSpPr>
+        <p:spPr>
+          <a:xfrm flipH="1">
+            <a:off x="8575288" y="2556403"/>
+            <a:ext cx="3122341" cy="369332"/>
+          </a:xfrm>
+          <a:prstGeom prst="rect">
+            <a:avLst/>
+          </a:prstGeom>
+          <a:noFill/>
+        </p:spPr>
+        <p:txBody>
+          <a:bodyPr wrap="square" rtlCol="0">
+            <a:spAutoFit/>
+          </a:bodyPr>
+          <a:lstStyle/>
+          <a:p>
+            <a:r>
+              <a:rPr lang="en-IT" dirty="0"/>
+              <a:t>E</a:t>
+            </a:r>
+            <a:r>
+              <a:rPr lang="en-GB" dirty="0"/>
+              <a:t>x</a:t>
+            </a:r>
+            <a:r>
+              <a:rPr lang="en-IT" dirty="0"/>
+              <a:t>plain better what is this hw</a:t>
+            </a:r>
+          </a:p>
+        </p:txBody>
+      </p:sp>
     </p:spTree>
     <p:extLst>
       <p:ext uri="{BB962C8B-B14F-4D97-AF65-F5344CB8AC3E}">

</xml_diff>